<commit_message>
CasRx has now default length to 23
</commit_message>
<xml_diff>
--- a/vignettes/figures/nucleases.pptx
+++ b/vignettes/figures/nucleases.pptx
@@ -197,7 +197,7 @@
           <a:p>
             <a:fld id="{F1A348B4-9975-524C-BE6E-E74FD2A3F22C}" type="datetimeFigureOut">
               <a:rPr lang="en-US" smtClean="0"/>
-              <a:t>12/22/21</a:t>
+              <a:t>3/2/22</a:t>
             </a:fld>
             <a:endParaRPr lang="en-US"/>
           </a:p>
@@ -684,7 +684,7 @@
           <a:p>
             <a:fld id="{DD6D9246-4FED-8E4D-BC9B-CDD794F2A5B7}" type="datetimeFigureOut">
               <a:rPr lang="en-US" smtClean="0"/>
-              <a:t>12/22/21</a:t>
+              <a:t>3/2/22</a:t>
             </a:fld>
             <a:endParaRPr lang="en-US"/>
           </a:p>
@@ -854,7 +854,7 @@
           <a:p>
             <a:fld id="{DD6D9246-4FED-8E4D-BC9B-CDD794F2A5B7}" type="datetimeFigureOut">
               <a:rPr lang="en-US" smtClean="0"/>
-              <a:t>12/22/21</a:t>
+              <a:t>3/2/22</a:t>
             </a:fld>
             <a:endParaRPr lang="en-US"/>
           </a:p>
@@ -1034,7 +1034,7 @@
           <a:p>
             <a:fld id="{DD6D9246-4FED-8E4D-BC9B-CDD794F2A5B7}" type="datetimeFigureOut">
               <a:rPr lang="en-US" smtClean="0"/>
-              <a:t>12/22/21</a:t>
+              <a:t>3/2/22</a:t>
             </a:fld>
             <a:endParaRPr lang="en-US"/>
           </a:p>
@@ -1204,7 +1204,7 @@
           <a:p>
             <a:fld id="{DD6D9246-4FED-8E4D-BC9B-CDD794F2A5B7}" type="datetimeFigureOut">
               <a:rPr lang="en-US" smtClean="0"/>
-              <a:t>12/22/21</a:t>
+              <a:t>3/2/22</a:t>
             </a:fld>
             <a:endParaRPr lang="en-US"/>
           </a:p>
@@ -1450,7 +1450,7 @@
           <a:p>
             <a:fld id="{DD6D9246-4FED-8E4D-BC9B-CDD794F2A5B7}" type="datetimeFigureOut">
               <a:rPr lang="en-US" smtClean="0"/>
-              <a:t>12/22/21</a:t>
+              <a:t>3/2/22</a:t>
             </a:fld>
             <a:endParaRPr lang="en-US"/>
           </a:p>
@@ -1682,7 +1682,7 @@
           <a:p>
             <a:fld id="{DD6D9246-4FED-8E4D-BC9B-CDD794F2A5B7}" type="datetimeFigureOut">
               <a:rPr lang="en-US" smtClean="0"/>
-              <a:t>12/22/21</a:t>
+              <a:t>3/2/22</a:t>
             </a:fld>
             <a:endParaRPr lang="en-US"/>
           </a:p>
@@ -2049,7 +2049,7 @@
           <a:p>
             <a:fld id="{DD6D9246-4FED-8E4D-BC9B-CDD794F2A5B7}" type="datetimeFigureOut">
               <a:rPr lang="en-US" smtClean="0"/>
-              <a:t>12/22/21</a:t>
+              <a:t>3/2/22</a:t>
             </a:fld>
             <a:endParaRPr lang="en-US"/>
           </a:p>
@@ -2167,7 +2167,7 @@
           <a:p>
             <a:fld id="{DD6D9246-4FED-8E4D-BC9B-CDD794F2A5B7}" type="datetimeFigureOut">
               <a:rPr lang="en-US" smtClean="0"/>
-              <a:t>12/22/21</a:t>
+              <a:t>3/2/22</a:t>
             </a:fld>
             <a:endParaRPr lang="en-US"/>
           </a:p>
@@ -2262,7 +2262,7 @@
           <a:p>
             <a:fld id="{DD6D9246-4FED-8E4D-BC9B-CDD794F2A5B7}" type="datetimeFigureOut">
               <a:rPr lang="en-US" smtClean="0"/>
-              <a:t>12/22/21</a:t>
+              <a:t>3/2/22</a:t>
             </a:fld>
             <a:endParaRPr lang="en-US"/>
           </a:p>
@@ -2539,7 +2539,7 @@
           <a:p>
             <a:fld id="{DD6D9246-4FED-8E4D-BC9B-CDD794F2A5B7}" type="datetimeFigureOut">
               <a:rPr lang="en-US" smtClean="0"/>
-              <a:t>12/22/21</a:t>
+              <a:t>3/2/22</a:t>
             </a:fld>
             <a:endParaRPr lang="en-US"/>
           </a:p>
@@ -2796,7 +2796,7 @@
           <a:p>
             <a:fld id="{DD6D9246-4FED-8E4D-BC9B-CDD794F2A5B7}" type="datetimeFigureOut">
               <a:rPr lang="en-US" smtClean="0"/>
-              <a:t>12/22/21</a:t>
+              <a:t>3/2/22</a:t>
             </a:fld>
             <a:endParaRPr lang="en-US"/>
           </a:p>
@@ -3009,7 +3009,7 @@
           <a:p>
             <a:fld id="{DD6D9246-4FED-8E4D-BC9B-CDD794F2A5B7}" type="datetimeFigureOut">
               <a:rPr lang="en-US" smtClean="0"/>
-              <a:t>12/22/21</a:t>
+              <a:t>3/2/22</a:t>
             </a:fld>
             <a:endParaRPr lang="en-US"/>
           </a:p>
@@ -8526,7 +8526,7 @@
             <a:pPr algn="ctr"/>
             <a:r>
               <a:rPr lang="en-US" sz="1921" dirty="0"/>
-              <a:t>22nt</a:t>
+              <a:t>23nt</a:t>
             </a:r>
           </a:p>
         </p:txBody>
@@ -8583,7 +8583,7 @@
         </p:nvCxnSpPr>
         <p:spPr>
           <a:xfrm>
-            <a:off x="7363540" y="8129164"/>
+            <a:off x="7158584" y="8129164"/>
             <a:ext cx="1293154" cy="0"/>
           </a:xfrm>
           <a:prstGeom prst="line">
@@ -8702,7 +8702,7 @@
         </p:nvSpPr>
         <p:spPr>
           <a:xfrm>
-            <a:off x="7304774" y="7826192"/>
+            <a:off x="7099818" y="7826192"/>
             <a:ext cx="368278" cy="338554"/>
           </a:xfrm>
           <a:prstGeom prst="rect">
@@ -8774,7 +8774,7 @@
         </p:nvSpPr>
         <p:spPr>
           <a:xfrm>
-            <a:off x="8682882" y="7902412"/>
+            <a:off x="8477925" y="7902412"/>
             <a:ext cx="5256242" cy="502766"/>
           </a:xfrm>
           <a:prstGeom prst="rect">
@@ -8798,7 +8798,7 @@
                 </a:solidFill>
                 <a:latin typeface="Courier" pitchFamily="2" charset="0"/>
               </a:rPr>
-              <a:t>CGGCTTGCAAACTCTCGCTCTA</a:t>
+              <a:t>CCGGCTTGCAAACTCTCGCTCTA</a:t>
             </a:r>
             <a:r>
               <a:rPr lang="en-US" sz="2667" dirty="0">
@@ -8828,7 +8828,7 @@
         </p:nvSpPr>
         <p:spPr>
           <a:xfrm>
-            <a:off x="8689661" y="8448938"/>
+            <a:off x="8484704" y="8448938"/>
             <a:ext cx="4955630" cy="502766"/>
           </a:xfrm>
           <a:prstGeom prst="rect">
@@ -8851,7 +8851,7 @@
                 </a:solidFill>
                 <a:latin typeface="Courier" pitchFamily="2" charset="0"/>
               </a:rPr>
-              <a:t>GCCGAACGUUUGAGAGCGAGAU</a:t>
+              <a:t>GGCCGAACGUUUGAGAGCGAGAU</a:t>
             </a:r>
           </a:p>
         </p:txBody>
@@ -8872,7 +8872,7 @@
         </p:nvCxnSpPr>
         <p:spPr>
           <a:xfrm>
-            <a:off x="8384494" y="8699398"/>
+            <a:off x="8179538" y="8699398"/>
             <a:ext cx="253721" cy="1"/>
           </a:xfrm>
           <a:prstGeom prst="line">
@@ -8913,7 +8913,7 @@
         </p:nvSpPr>
         <p:spPr>
           <a:xfrm>
-            <a:off x="8452477" y="8398477"/>
+            <a:off x="8247521" y="8398477"/>
             <a:ext cx="368278" cy="338554"/>
           </a:xfrm>
           <a:prstGeom prst="rect">
@@ -9026,7 +9026,7 @@
         </p:nvSpPr>
         <p:spPr>
           <a:xfrm>
-            <a:off x="7567709" y="8514498"/>
+            <a:off x="7362753" y="8514498"/>
             <a:ext cx="1080813" cy="353943"/>
           </a:xfrm>
           <a:prstGeom prst="rect">
@@ -9146,10 +9146,10 @@
         </p:nvGrpSpPr>
         <p:grpSpPr>
           <a:xfrm>
-            <a:off x="8885857" y="8329926"/>
-            <a:ext cx="4262398" cy="185269"/>
-            <a:chOff x="2537530" y="2602325"/>
-            <a:chExt cx="3995999" cy="173689"/>
+            <a:off x="8676060" y="8329926"/>
+            <a:ext cx="4472195" cy="185269"/>
+            <a:chOff x="2340845" y="2602325"/>
+            <a:chExt cx="4192684" cy="173689"/>
           </a:xfrm>
         </p:grpSpPr>
         <p:cxnSp>
@@ -10072,6 +10072,49 @@
           <p:spPr>
             <a:xfrm>
               <a:off x="6533529" y="2607449"/>
+              <a:ext cx="0" cy="168565"/>
+            </a:xfrm>
+            <a:prstGeom prst="line">
+              <a:avLst/>
+            </a:prstGeom>
+            <a:ln w="15875">
+              <a:solidFill>
+                <a:schemeClr val="tx1"/>
+              </a:solidFill>
+            </a:ln>
+          </p:spPr>
+          <p:style>
+            <a:lnRef idx="1">
+              <a:schemeClr val="accent1"/>
+            </a:lnRef>
+            <a:fillRef idx="0">
+              <a:schemeClr val="accent1"/>
+            </a:fillRef>
+            <a:effectRef idx="0">
+              <a:schemeClr val="accent1"/>
+            </a:effectRef>
+            <a:fontRef idx="minor">
+              <a:schemeClr val="tx1"/>
+            </a:fontRef>
+          </p:style>
+        </p:cxnSp>
+        <p:cxnSp>
+          <p:nvCxnSpPr>
+            <p:cNvPr id="172" name="Straight Connector 171">
+              <a:extLst>
+                <a:ext uri="{FF2B5EF4-FFF2-40B4-BE49-F238E27FC236}">
+                  <a16:creationId xmlns:a16="http://schemas.microsoft.com/office/drawing/2014/main" id="{F826B130-7CFE-8541-8636-B88730AE8E05}"/>
+                </a:ext>
+              </a:extLst>
+            </p:cNvPr>
+            <p:cNvCxnSpPr>
+              <a:cxnSpLocks/>
+            </p:cNvCxnSpPr>
+            <p:nvPr/>
+          </p:nvCxnSpPr>
+          <p:spPr>
+            <a:xfrm>
+              <a:off x="2340845" y="2606795"/>
               <a:ext cx="0" cy="168565"/>
             </a:xfrm>
             <a:prstGeom prst="line">

</xml_diff>

<commit_message>
Changed protospacer to target, and spacer to protospcer
</commit_message>
<xml_diff>
--- a/vignettes/figures/nucleases.pptx
+++ b/vignettes/figures/nucleases.pptx
@@ -197,7 +197,7 @@
           <a:p>
             <a:fld id="{F1A348B4-9975-524C-BE6E-E74FD2A3F22C}" type="datetimeFigureOut">
               <a:rPr lang="en-US" smtClean="0"/>
-              <a:t>3/2/22</a:t>
+              <a:t>3/8/22</a:t>
             </a:fld>
             <a:endParaRPr lang="en-US"/>
           </a:p>
@@ -684,7 +684,7 @@
           <a:p>
             <a:fld id="{DD6D9246-4FED-8E4D-BC9B-CDD794F2A5B7}" type="datetimeFigureOut">
               <a:rPr lang="en-US" smtClean="0"/>
-              <a:t>3/2/22</a:t>
+              <a:t>3/8/22</a:t>
             </a:fld>
             <a:endParaRPr lang="en-US"/>
           </a:p>
@@ -854,7 +854,7 @@
           <a:p>
             <a:fld id="{DD6D9246-4FED-8E4D-BC9B-CDD794F2A5B7}" type="datetimeFigureOut">
               <a:rPr lang="en-US" smtClean="0"/>
-              <a:t>3/2/22</a:t>
+              <a:t>3/8/22</a:t>
             </a:fld>
             <a:endParaRPr lang="en-US"/>
           </a:p>
@@ -1034,7 +1034,7 @@
           <a:p>
             <a:fld id="{DD6D9246-4FED-8E4D-BC9B-CDD794F2A5B7}" type="datetimeFigureOut">
               <a:rPr lang="en-US" smtClean="0"/>
-              <a:t>3/2/22</a:t>
+              <a:t>3/8/22</a:t>
             </a:fld>
             <a:endParaRPr lang="en-US"/>
           </a:p>
@@ -1204,7 +1204,7 @@
           <a:p>
             <a:fld id="{DD6D9246-4FED-8E4D-BC9B-CDD794F2A5B7}" type="datetimeFigureOut">
               <a:rPr lang="en-US" smtClean="0"/>
-              <a:t>3/2/22</a:t>
+              <a:t>3/8/22</a:t>
             </a:fld>
             <a:endParaRPr lang="en-US"/>
           </a:p>
@@ -1450,7 +1450,7 @@
           <a:p>
             <a:fld id="{DD6D9246-4FED-8E4D-BC9B-CDD794F2A5B7}" type="datetimeFigureOut">
               <a:rPr lang="en-US" smtClean="0"/>
-              <a:t>3/2/22</a:t>
+              <a:t>3/8/22</a:t>
             </a:fld>
             <a:endParaRPr lang="en-US"/>
           </a:p>
@@ -1682,7 +1682,7 @@
           <a:p>
             <a:fld id="{DD6D9246-4FED-8E4D-BC9B-CDD794F2A5B7}" type="datetimeFigureOut">
               <a:rPr lang="en-US" smtClean="0"/>
-              <a:t>3/2/22</a:t>
+              <a:t>3/8/22</a:t>
             </a:fld>
             <a:endParaRPr lang="en-US"/>
           </a:p>
@@ -2049,7 +2049,7 @@
           <a:p>
             <a:fld id="{DD6D9246-4FED-8E4D-BC9B-CDD794F2A5B7}" type="datetimeFigureOut">
               <a:rPr lang="en-US" smtClean="0"/>
-              <a:t>3/2/22</a:t>
+              <a:t>3/8/22</a:t>
             </a:fld>
             <a:endParaRPr lang="en-US"/>
           </a:p>
@@ -2167,7 +2167,7 @@
           <a:p>
             <a:fld id="{DD6D9246-4FED-8E4D-BC9B-CDD794F2A5B7}" type="datetimeFigureOut">
               <a:rPr lang="en-US" smtClean="0"/>
-              <a:t>3/2/22</a:t>
+              <a:t>3/8/22</a:t>
             </a:fld>
             <a:endParaRPr lang="en-US"/>
           </a:p>
@@ -2262,7 +2262,7 @@
           <a:p>
             <a:fld id="{DD6D9246-4FED-8E4D-BC9B-CDD794F2A5B7}" type="datetimeFigureOut">
               <a:rPr lang="en-US" smtClean="0"/>
-              <a:t>3/2/22</a:t>
+              <a:t>3/8/22</a:t>
             </a:fld>
             <a:endParaRPr lang="en-US"/>
           </a:p>
@@ -2539,7 +2539,7 @@
           <a:p>
             <a:fld id="{DD6D9246-4FED-8E4D-BC9B-CDD794F2A5B7}" type="datetimeFigureOut">
               <a:rPr lang="en-US" smtClean="0"/>
-              <a:t>3/2/22</a:t>
+              <a:t>3/8/22</a:t>
             </a:fld>
             <a:endParaRPr lang="en-US"/>
           </a:p>
@@ -2796,7 +2796,7 @@
           <a:p>
             <a:fld id="{DD6D9246-4FED-8E4D-BC9B-CDD794F2A5B7}" type="datetimeFigureOut">
               <a:rPr lang="en-US" smtClean="0"/>
-              <a:t>3/2/22</a:t>
+              <a:t>3/8/22</a:t>
             </a:fld>
             <a:endParaRPr lang="en-US"/>
           </a:p>
@@ -3009,7 +3009,7 @@
           <a:p>
             <a:fld id="{DD6D9246-4FED-8E4D-BC9B-CDD794F2A5B7}" type="datetimeFigureOut">
               <a:rPr lang="en-US" smtClean="0"/>
-              <a:t>3/2/22</a:t>
+              <a:t>3/8/22</a:t>
             </a:fld>
             <a:endParaRPr lang="en-US"/>
           </a:p>
@@ -8798,7 +8798,7 @@
                 </a:solidFill>
                 <a:latin typeface="Courier" pitchFamily="2" charset="0"/>
               </a:rPr>
-              <a:t>CCGGCTTGCAAACTCTCGCTCTA</a:t>
+              <a:t>CCGGCUUGCAAACUCUCGCUCUA</a:t>
             </a:r>
             <a:r>
               <a:rPr lang="en-US" sz="2667" dirty="0">

</xml_diff>